<commit_message>
Add lecture content, reorg dates
</commit_message>
<xml_diff>
--- a/ex/552-F20/staging/552-F20/lectures/05-directories.pptx
+++ b/ex/552-F20/staging/552-F20/lectures/05-directories.pptx
@@ -5,7 +5,7 @@
     <p:sldMasterId id="2147483648" r:id="rId1"/>
   </p:sldMasterIdLst>
   <p:notesMasterIdLst>
-    <p:notesMasterId r:id="rId13"/>
+    <p:notesMasterId r:id="rId15"/>
   </p:notesMasterIdLst>
   <p:sldIdLst>
     <p:sldId id="256" r:id="rId2"/>
@@ -19,6 +19,8 @@
     <p:sldId id="1202" r:id="rId10"/>
     <p:sldId id="1203" r:id="rId11"/>
     <p:sldId id="1204" r:id="rId12"/>
+    <p:sldId id="1205" r:id="rId13"/>
+    <p:sldId id="1206" r:id="rId14"/>
   </p:sldIdLst>
   <p:sldSz cx="12192000" cy="6858000"/>
   <p:notesSz cx="6858000" cy="9144000"/>
@@ -207,7 +209,7 @@
           <a:p>
             <a:fld id="{4F542666-03D5-5341-A833-B4D3FAA577B7}" type="datetimeFigureOut">
               <a:rPr lang="en-US" smtClean="0"/>
-              <a:t>9/14/20</a:t>
+              <a:t>9/15/20</a:t>
             </a:fld>
             <a:endParaRPr lang="en-US"/>
           </a:p>
@@ -1433,7 +1435,7 @@
           <a:p>
             <a:fld id="{DCCCB3B3-0381-6043-97A3-E72CD5022D9A}" type="datetimeFigureOut">
               <a:rPr lang="en-US" smtClean="0"/>
-              <a:t>9/14/20</a:t>
+              <a:t>9/15/20</a:t>
             </a:fld>
             <a:endParaRPr lang="en-US"/>
           </a:p>
@@ -1601,7 +1603,7 @@
           <a:p>
             <a:fld id="{DCCCB3B3-0381-6043-97A3-E72CD5022D9A}" type="datetimeFigureOut">
               <a:rPr lang="en-US" smtClean="0"/>
-              <a:t>9/14/20</a:t>
+              <a:t>9/15/20</a:t>
             </a:fld>
             <a:endParaRPr lang="en-US"/>
           </a:p>
@@ -1779,7 +1781,7 @@
           <a:p>
             <a:fld id="{DCCCB3B3-0381-6043-97A3-E72CD5022D9A}" type="datetimeFigureOut">
               <a:rPr lang="en-US" smtClean="0"/>
-              <a:t>9/14/20</a:t>
+              <a:t>9/15/20</a:t>
             </a:fld>
             <a:endParaRPr lang="en-US"/>
           </a:p>
@@ -1947,7 +1949,7 @@
           <a:p>
             <a:fld id="{DCCCB3B3-0381-6043-97A3-E72CD5022D9A}" type="datetimeFigureOut">
               <a:rPr lang="en-US" smtClean="0"/>
-              <a:t>9/14/20</a:t>
+              <a:t>9/15/20</a:t>
             </a:fld>
             <a:endParaRPr lang="en-US"/>
           </a:p>
@@ -2192,7 +2194,7 @@
           <a:p>
             <a:fld id="{DCCCB3B3-0381-6043-97A3-E72CD5022D9A}" type="datetimeFigureOut">
               <a:rPr lang="en-US" smtClean="0"/>
-              <a:t>9/14/20</a:t>
+              <a:t>9/15/20</a:t>
             </a:fld>
             <a:endParaRPr lang="en-US"/>
           </a:p>
@@ -2421,7 +2423,7 @@
           <a:p>
             <a:fld id="{DCCCB3B3-0381-6043-97A3-E72CD5022D9A}" type="datetimeFigureOut">
               <a:rPr lang="en-US" smtClean="0"/>
-              <a:t>9/14/20</a:t>
+              <a:t>9/15/20</a:t>
             </a:fld>
             <a:endParaRPr lang="en-US"/>
           </a:p>
@@ -2785,7 +2787,7 @@
           <a:p>
             <a:fld id="{DCCCB3B3-0381-6043-97A3-E72CD5022D9A}" type="datetimeFigureOut">
               <a:rPr lang="en-US" smtClean="0"/>
-              <a:t>9/14/20</a:t>
+              <a:t>9/15/20</a:t>
             </a:fld>
             <a:endParaRPr lang="en-US"/>
           </a:p>
@@ -2902,7 +2904,7 @@
           <a:p>
             <a:fld id="{DCCCB3B3-0381-6043-97A3-E72CD5022D9A}" type="datetimeFigureOut">
               <a:rPr lang="en-US" smtClean="0"/>
-              <a:t>9/14/20</a:t>
+              <a:t>9/15/20</a:t>
             </a:fld>
             <a:endParaRPr lang="en-US"/>
           </a:p>
@@ -2997,7 +2999,7 @@
           <a:p>
             <a:fld id="{DCCCB3B3-0381-6043-97A3-E72CD5022D9A}" type="datetimeFigureOut">
               <a:rPr lang="en-US" smtClean="0"/>
-              <a:t>9/14/20</a:t>
+              <a:t>9/15/20</a:t>
             </a:fld>
             <a:endParaRPr lang="en-US"/>
           </a:p>
@@ -3272,7 +3274,7 @@
           <a:p>
             <a:fld id="{DCCCB3B3-0381-6043-97A3-E72CD5022D9A}" type="datetimeFigureOut">
               <a:rPr lang="en-US" smtClean="0"/>
-              <a:t>9/14/20</a:t>
+              <a:t>9/15/20</a:t>
             </a:fld>
             <a:endParaRPr lang="en-US"/>
           </a:p>
@@ -3524,7 +3526,7 @@
           <a:p>
             <a:fld id="{DCCCB3B3-0381-6043-97A3-E72CD5022D9A}" type="datetimeFigureOut">
               <a:rPr lang="en-US" smtClean="0"/>
-              <a:t>9/14/20</a:t>
+              <a:t>9/15/20</a:t>
             </a:fld>
             <a:endParaRPr lang="en-US"/>
           </a:p>
@@ -3735,7 +3737,7 @@
           <a:p>
             <a:fld id="{DCCCB3B3-0381-6043-97A3-E72CD5022D9A}" type="datetimeFigureOut">
               <a:rPr lang="en-US" smtClean="0"/>
-              <a:t>9/14/20</a:t>
+              <a:t>9/15/20</a:t>
             </a:fld>
             <a:endParaRPr lang="en-US"/>
           </a:p>
@@ -15518,6 +15520,271 @@
 </p:sld>
 </file>
 
+<file path=ppt/slides/slide12.xml><?xml version="1.0" encoding="utf-8"?>
+<p:sld xmlns:a="http://schemas.openxmlformats.org/drawingml/2006/main" xmlns:r="http://schemas.openxmlformats.org/officeDocument/2006/relationships" xmlns:p="http://schemas.openxmlformats.org/presentationml/2006/main">
+  <p:cSld>
+    <p:spTree>
+      <p:nvGrpSpPr>
+        <p:cNvPr id="1" name=""/>
+        <p:cNvGrpSpPr/>
+        <p:nvPr/>
+      </p:nvGrpSpPr>
+      <p:grpSpPr>
+        <a:xfrm>
+          <a:off x="0" y="0"/>
+          <a:ext cx="0" cy="0"/>
+          <a:chOff x="0" y="0"/>
+          <a:chExt cx="0" cy="0"/>
+        </a:xfrm>
+      </p:grpSpPr>
+      <p:sp>
+        <p:nvSpPr>
+          <p:cNvPr id="2" name="Title 1">
+            <a:extLst>
+              <a:ext uri="{FF2B5EF4-FFF2-40B4-BE49-F238E27FC236}">
+                <a16:creationId xmlns:a16="http://schemas.microsoft.com/office/drawing/2014/main" id="{8154C756-6D2C-5042-9F4E-282BA03AD533}"/>
+              </a:ext>
+            </a:extLst>
+          </p:cNvPr>
+          <p:cNvSpPr>
+            <a:spLocks noGrp="1"/>
+          </p:cNvSpPr>
+          <p:nvPr>
+            <p:ph type="title"/>
+          </p:nvPr>
+        </p:nvSpPr>
+        <p:spPr/>
+        <p:txBody>
+          <a:bodyPr/>
+          <a:lstStyle/>
+          <a:p>
+            <a:r>
+              <a:rPr lang="en-US" dirty="0"/>
+              <a:t>Playing with DNS</a:t>
+            </a:r>
+          </a:p>
+        </p:txBody>
+      </p:sp>
+      <p:pic>
+        <p:nvPicPr>
+          <p:cNvPr id="6" name="Content Placeholder 5" descr="A close up of a sign&#10;&#10;Description automatically generated">
+            <a:extLst>
+              <a:ext uri="{FF2B5EF4-FFF2-40B4-BE49-F238E27FC236}">
+                <a16:creationId xmlns:a16="http://schemas.microsoft.com/office/drawing/2014/main" id="{C8061521-870E-4D4B-97BA-88D922142A3F}"/>
+              </a:ext>
+            </a:extLst>
+          </p:cNvPr>
+          <p:cNvPicPr>
+            <a:picLocks noGrp="1" noChangeAspect="1"/>
+          </p:cNvPicPr>
+          <p:nvPr>
+            <p:ph sz="half" idx="1"/>
+          </p:nvPr>
+        </p:nvPicPr>
+        <p:blipFill>
+          <a:blip r:embed="rId2"/>
+          <a:stretch>
+            <a:fillRect/>
+          </a:stretch>
+        </p:blipFill>
+        <p:spPr>
+          <a:xfrm>
+            <a:off x="2843915" y="1752900"/>
+            <a:ext cx="2506417" cy="546512"/>
+          </a:xfrm>
+        </p:spPr>
+      </p:pic>
+      <p:pic>
+        <p:nvPicPr>
+          <p:cNvPr id="8" name="Picture 7">
+            <a:extLst>
+              <a:ext uri="{FF2B5EF4-FFF2-40B4-BE49-F238E27FC236}">
+                <a16:creationId xmlns:a16="http://schemas.microsoft.com/office/drawing/2014/main" id="{54651E30-B538-C344-9F89-F61AC56B6FD2}"/>
+              </a:ext>
+            </a:extLst>
+          </p:cNvPr>
+          <p:cNvPicPr>
+            <a:picLocks noChangeAspect="1"/>
+          </p:cNvPicPr>
+          <p:nvPr/>
+        </p:nvPicPr>
+        <p:blipFill>
+          <a:blip r:embed="rId3"/>
+          <a:stretch>
+            <a:fillRect/>
+          </a:stretch>
+        </p:blipFill>
+        <p:spPr>
+          <a:xfrm>
+            <a:off x="3278932" y="2908137"/>
+            <a:ext cx="5760896" cy="3483332"/>
+          </a:xfrm>
+          <a:prstGeom prst="rect">
+            <a:avLst/>
+          </a:prstGeom>
+        </p:spPr>
+      </p:pic>
+      <p:pic>
+        <p:nvPicPr>
+          <p:cNvPr id="13" name="Picture 12">
+            <a:extLst>
+              <a:ext uri="{FF2B5EF4-FFF2-40B4-BE49-F238E27FC236}">
+                <a16:creationId xmlns:a16="http://schemas.microsoft.com/office/drawing/2014/main" id="{5C56FD27-432F-3448-94E7-64EF028C3BDF}"/>
+              </a:ext>
+            </a:extLst>
+          </p:cNvPr>
+          <p:cNvPicPr>
+            <a:picLocks noChangeAspect="1"/>
+          </p:cNvPicPr>
+          <p:nvPr/>
+        </p:nvPicPr>
+        <p:blipFill>
+          <a:blip r:embed="rId4"/>
+          <a:stretch>
+            <a:fillRect/>
+          </a:stretch>
+        </p:blipFill>
+        <p:spPr>
+          <a:xfrm>
+            <a:off x="7282808" y="1752899"/>
+            <a:ext cx="3298584" cy="546511"/>
+          </a:xfrm>
+          <a:prstGeom prst="rect">
+            <a:avLst/>
+          </a:prstGeom>
+        </p:spPr>
+      </p:pic>
+    </p:spTree>
+    <p:extLst>
+      <p:ext uri="{BB962C8B-B14F-4D97-AF65-F5344CB8AC3E}">
+        <p14:creationId xmlns:p14="http://schemas.microsoft.com/office/powerpoint/2010/main" val="2611406223"/>
+      </p:ext>
+    </p:extLst>
+  </p:cSld>
+  <p:clrMapOvr>
+    <a:masterClrMapping/>
+  </p:clrMapOvr>
+</p:sld>
+</file>
+
+<file path=ppt/slides/slide13.xml><?xml version="1.0" encoding="utf-8"?>
+<p:sld xmlns:a="http://schemas.openxmlformats.org/drawingml/2006/main" xmlns:r="http://schemas.openxmlformats.org/officeDocument/2006/relationships" xmlns:p="http://schemas.openxmlformats.org/presentationml/2006/main">
+  <p:cSld>
+    <p:spTree>
+      <p:nvGrpSpPr>
+        <p:cNvPr id="1" name=""/>
+        <p:cNvGrpSpPr/>
+        <p:nvPr/>
+      </p:nvGrpSpPr>
+      <p:grpSpPr>
+        <a:xfrm>
+          <a:off x="0" y="0"/>
+          <a:ext cx="0" cy="0"/>
+          <a:chOff x="0" y="0"/>
+          <a:chExt cx="0" cy="0"/>
+        </a:xfrm>
+      </p:grpSpPr>
+      <p:sp>
+        <p:nvSpPr>
+          <p:cNvPr id="2" name="Title 1">
+            <a:extLst>
+              <a:ext uri="{FF2B5EF4-FFF2-40B4-BE49-F238E27FC236}">
+                <a16:creationId xmlns:a16="http://schemas.microsoft.com/office/drawing/2014/main" id="{3274BB94-B0F6-1E44-900B-A26EECD1B8B3}"/>
+              </a:ext>
+            </a:extLst>
+          </p:cNvPr>
+          <p:cNvSpPr>
+            <a:spLocks noGrp="1"/>
+          </p:cNvSpPr>
+          <p:nvPr>
+            <p:ph type="title"/>
+          </p:nvPr>
+        </p:nvSpPr>
+        <p:spPr/>
+        <p:txBody>
+          <a:bodyPr/>
+          <a:lstStyle/>
+          <a:p>
+            <a:r>
+              <a:rPr lang="en-US" dirty="0"/>
+              <a:t>Playing with ARP</a:t>
+            </a:r>
+          </a:p>
+        </p:txBody>
+      </p:sp>
+      <p:pic>
+        <p:nvPicPr>
+          <p:cNvPr id="6" name="Picture 5">
+            <a:extLst>
+              <a:ext uri="{FF2B5EF4-FFF2-40B4-BE49-F238E27FC236}">
+                <a16:creationId xmlns:a16="http://schemas.microsoft.com/office/drawing/2014/main" id="{799C8861-E138-704A-881A-2883A5BDA2C2}"/>
+              </a:ext>
+            </a:extLst>
+          </p:cNvPr>
+          <p:cNvPicPr>
+            <a:picLocks noChangeAspect="1"/>
+          </p:cNvPicPr>
+          <p:nvPr/>
+        </p:nvPicPr>
+        <p:blipFill>
+          <a:blip r:embed="rId2"/>
+          <a:stretch>
+            <a:fillRect/>
+          </a:stretch>
+        </p:blipFill>
+        <p:spPr>
+          <a:xfrm>
+            <a:off x="4905263" y="2091011"/>
+            <a:ext cx="2381474" cy="722470"/>
+          </a:xfrm>
+          <a:prstGeom prst="rect">
+            <a:avLst/>
+          </a:prstGeom>
+        </p:spPr>
+      </p:pic>
+      <p:pic>
+        <p:nvPicPr>
+          <p:cNvPr id="7" name="Picture 6">
+            <a:extLst>
+              <a:ext uri="{FF2B5EF4-FFF2-40B4-BE49-F238E27FC236}">
+                <a16:creationId xmlns:a16="http://schemas.microsoft.com/office/drawing/2014/main" id="{E3E1F9D6-492F-2A43-BEA2-83A7A4BBB579}"/>
+              </a:ext>
+            </a:extLst>
+          </p:cNvPr>
+          <p:cNvPicPr>
+            <a:picLocks noChangeAspect="1"/>
+          </p:cNvPicPr>
+          <p:nvPr/>
+        </p:nvPicPr>
+        <p:blipFill>
+          <a:blip r:embed="rId3"/>
+          <a:stretch>
+            <a:fillRect/>
+          </a:stretch>
+        </p:blipFill>
+        <p:spPr>
+          <a:xfrm>
+            <a:off x="1429098" y="3941956"/>
+            <a:ext cx="9785725" cy="959091"/>
+          </a:xfrm>
+          <a:prstGeom prst="rect">
+            <a:avLst/>
+          </a:prstGeom>
+        </p:spPr>
+      </p:pic>
+    </p:spTree>
+    <p:extLst>
+      <p:ext uri="{BB962C8B-B14F-4D97-AF65-F5344CB8AC3E}">
+        <p14:creationId xmlns:p14="http://schemas.microsoft.com/office/powerpoint/2010/main" val="616959027"/>
+      </p:ext>
+    </p:extLst>
+  </p:cSld>
+  <p:clrMapOvr>
+    <a:masterClrMapping/>
+  </p:clrMapOvr>
+</p:sld>
+</file>
+
 <file path=ppt/slides/slide2.xml><?xml version="1.0" encoding="utf-8"?>
 <p:sld xmlns:a="http://schemas.openxmlformats.org/drawingml/2006/main" xmlns:r="http://schemas.openxmlformats.org/officeDocument/2006/relationships" xmlns:p="http://schemas.openxmlformats.org/presentationml/2006/main">
   <p:cSld>
@@ -17295,7 +17562,7 @@
             <a:pPr algn="ctr"/>
             <a:r>
               <a:rPr lang="en-US" dirty="0"/>
-              <a:t>Where do all the addresses come from?</a:t>
+              <a:t>Where do all the addresses come from? Who assigns them, and how?</a:t>
             </a:r>
           </a:p>
         </p:txBody>
@@ -17426,31 +17693,6 @@
             <a:endParaRPr lang="en-US" dirty="0"/>
           </a:p>
           <a:p>
-            <a:r>
-              <a:rPr lang="en-US" dirty="0"/>
-              <a:t>Do we need all these addresses, or can we get rid of some?</a:t>
-            </a:r>
-          </a:p>
-          <a:p>
-            <a:pPr lvl="1"/>
-            <a:r>
-              <a:rPr lang="en-US" dirty="0"/>
-              <a:t>Should addresses correspond to the endpoint, or point of attachment, or to the application?</a:t>
-            </a:r>
-          </a:p>
-          <a:p>
-            <a:pPr marL="0" indent="0">
-              <a:buNone/>
-            </a:pPr>
-            <a:endParaRPr lang="en-US" dirty="0"/>
-          </a:p>
-          <a:p>
-            <a:r>
-              <a:rPr lang="en-US" dirty="0"/>
-              <a:t>How does your laptop find all the other addresses?</a:t>
-            </a:r>
-          </a:p>
-          <a:p>
             <a:endParaRPr lang="en-US" dirty="0"/>
           </a:p>
           <a:p>
@@ -17657,7 +17899,7 @@
           <a:p>
             <a:r>
               <a:rPr lang="en-US" altLang="en-US" dirty="0"/>
-              <a:t>Directories</a:t>
+              <a:t>Directory Services</a:t>
             </a:r>
           </a:p>
         </p:txBody>
@@ -17719,7 +17961,7 @@
               <a:rPr lang="en-US" altLang="en-US" dirty="0">
                 <a:ea typeface="ＭＳ Ｐゴシック" charset="-128"/>
               </a:rPr>
-              <a:t>Central directory</a:t>
+              <a:t>Centralized directory</a:t>
             </a:r>
           </a:p>
           <a:p>
@@ -18185,7 +18427,7 @@
           <a:graphicData uri="http://schemas.openxmlformats.org/presentationml/2006/ole">
             <mc:AlternateContent xmlns:mc="http://schemas.openxmlformats.org/markup-compatibility/2006">
               <mc:Choice xmlns:v="urn:schemas-microsoft-com:vml" Requires="v">
-                <p:oleObj spid="_x0000_s1195" name="Clip" r:id="rId4" imgW="24269700" imgH="20129500" progId="MS_ClipArt_Gallery.2">
+                <p:oleObj spid="_x0000_s1263" name="Clip" r:id="rId4" imgW="24269700" imgH="20129500" progId="MS_ClipArt_Gallery.2">
                   <p:embed/>
                 </p:oleObj>
               </mc:Choice>
@@ -18639,7 +18881,7 @@
           <a:graphicData uri="http://schemas.openxmlformats.org/presentationml/2006/ole">
             <mc:AlternateContent xmlns:mc="http://schemas.openxmlformats.org/markup-compatibility/2006">
               <mc:Choice xmlns:v="urn:schemas-microsoft-com:vml" Requires="v">
-                <p:oleObj spid="_x0000_s1196" name="Clip" r:id="rId6" imgW="24269700" imgH="20129500" progId="MS_ClipArt_Gallery.2">
+                <p:oleObj spid="_x0000_s1264" name="Clip" r:id="rId6" imgW="24269700" imgH="20129500" progId="MS_ClipArt_Gallery.2">
                   <p:embed/>
                 </p:oleObj>
               </mc:Choice>
@@ -25751,7 +25993,7 @@
         <p:spPr>
           <a:xfrm>
             <a:off x="416438" y="3400199"/>
-            <a:ext cx="3558746" cy="1384995"/>
+            <a:ext cx="3558746" cy="1815882"/>
           </a:xfrm>
           <a:prstGeom prst="rect">
             <a:avLst/>
@@ -25769,11 +26011,41 @@
               <a:rPr lang="en-US" sz="2800" dirty="0">
                 <a:latin typeface="Helvetica" pitchFamily="2" charset="0"/>
               </a:rPr>
-              <a:t>Q: In your home, who runs the local DNS server?</a:t>
+              <a:t>At your home, your Wi-Fi router typically runs the local DNS resolver.</a:t>
             </a:r>
           </a:p>
         </p:txBody>
       </p:sp>
+      <p:pic>
+        <p:nvPicPr>
+          <p:cNvPr id="68" name="Picture 67" descr="A close up of a device&#10;&#10;Description automatically generated">
+            <a:extLst>
+              <a:ext uri="{FF2B5EF4-FFF2-40B4-BE49-F238E27FC236}">
+                <a16:creationId xmlns:a16="http://schemas.microsoft.com/office/drawing/2014/main" id="{BCAA7397-312B-F542-A9CF-A35D5EB2FDD5}"/>
+              </a:ext>
+            </a:extLst>
+          </p:cNvPr>
+          <p:cNvPicPr>
+            <a:picLocks noChangeAspect="1"/>
+          </p:cNvPicPr>
+          <p:nvPr/>
+        </p:nvPicPr>
+        <p:blipFill>
+          <a:blip r:embed="rId7"/>
+          <a:stretch>
+            <a:fillRect/>
+          </a:stretch>
+        </p:blipFill>
+        <p:spPr>
+          <a:xfrm>
+            <a:off x="248162" y="4781255"/>
+            <a:ext cx="1237147" cy="1237147"/>
+          </a:xfrm>
+          <a:prstGeom prst="rect">
+            <a:avLst/>
+          </a:prstGeom>
+        </p:spPr>
+      </p:pic>
     </p:spTree>
     <p:extLst>
       <p:ext uri="{BB962C8B-B14F-4D97-AF65-F5344CB8AC3E}">
@@ -26411,6 +26683,33 @@
                                   </p:childTnLst>
                                 </p:cTn>
                               </p:par>
+                              <p:par>
+                                <p:cTn id="55" presetID="1" presetClass="entr" presetSubtype="0" fill="hold" nodeType="withEffect">
+                                  <p:stCondLst>
+                                    <p:cond delay="0"/>
+                                  </p:stCondLst>
+                                  <p:childTnLst>
+                                    <p:set>
+                                      <p:cBhvr>
+                                        <p:cTn id="56" dur="1" fill="hold">
+                                          <p:stCondLst>
+                                            <p:cond delay="0"/>
+                                          </p:stCondLst>
+                                        </p:cTn>
+                                        <p:tgtEl>
+                                          <p:spTgt spid="68"/>
+                                        </p:tgtEl>
+                                        <p:attrNameLst>
+                                          <p:attrName>style.visibility</p:attrName>
+                                        </p:attrNameLst>
+                                      </p:cBhvr>
+                                      <p:to>
+                                        <p:strVal val="visible"/>
+                                      </p:to>
+                                    </p:set>
+                                  </p:childTnLst>
+                                </p:cTn>
+                              </p:par>
                             </p:childTnLst>
                           </p:cTn>
                         </p:par>
@@ -26535,7 +26834,7 @@
         <p:spPr>
           <a:xfrm>
             <a:off x="6082748" y="2344599"/>
-            <a:ext cx="5193195" cy="953237"/>
+            <a:ext cx="5785073" cy="953237"/>
           </a:xfrm>
           <a:prstGeom prst="rect">
             <a:avLst/>
@@ -26543,7 +26842,7 @@
         </p:spPr>
         <p:txBody>
           <a:bodyPr vert="horz" lIns="91440" tIns="45720" rIns="91440" bIns="45720" rtlCol="0">
-            <a:normAutofit/>
+            <a:normAutofit fontScale="92500"/>
           </a:bodyPr>
           <a:lstStyle>
             <a:lvl1pPr marL="352425" indent="-222250" algn="l" defTabSz="914400" rtl="0" eaLnBrk="1" latinLnBrk="0" hangingPunct="1">
@@ -26736,7 +27035,7 @@
               <a:rPr lang="en-US" dirty="0">
                 <a:latin typeface="Helvetica" pitchFamily="2" charset="0"/>
               </a:rPr>
-              <a:t>each IP node (host, router) on LAN has table</a:t>
+              <a:t>each IP node (host, router) on the local network has table</a:t>
             </a:r>
           </a:p>
         </p:txBody>
@@ -31346,8 +31645,8 @@
         </p:nvSpPr>
         <p:spPr>
           <a:xfrm>
-            <a:off x="5785443" y="3298343"/>
-            <a:ext cx="5472170" cy="2907585"/>
+            <a:off x="5785442" y="3298343"/>
+            <a:ext cx="6182775" cy="3210231"/>
           </a:xfrm>
           <a:prstGeom prst="rect">
             <a:avLst/>
@@ -31537,7 +31836,20 @@
               <a:rPr lang="en-US" sz="2800" dirty="0">
                 <a:latin typeface="Helvetica" pitchFamily="2" charset="0"/>
               </a:rPr>
-              <a:t>IP/MAC address mappings for some LAN nodes:</a:t>
+              <a:t>Contain IP </a:t>
+            </a:r>
+            <a:r>
+              <a:rPr lang="en-US" sz="2800" dirty="0">
+                <a:latin typeface="Helvetica" pitchFamily="2" charset="0"/>
+                <a:sym typeface="Wingdings" pitchFamily="2" charset="2"/>
+              </a:rPr>
+              <a:t> </a:t>
+            </a:r>
+            <a:r>
+              <a:rPr lang="en-US" sz="2800" dirty="0">
+                <a:latin typeface="Helvetica" pitchFamily="2" charset="0"/>
+              </a:rPr>
+              <a:t>MAC address mappings for some nodes:</a:t>
             </a:r>
           </a:p>
           <a:p>
@@ -31561,6 +31873,19 @@
               </a:rPr>
               <a:t>&lt; IP address; MAC address; TTL&gt;</a:t>
             </a:r>
+          </a:p>
+          <a:p>
+            <a:pPr>
+              <a:buFont typeface="Wingdings" charset="0"/>
+              <a:buNone/>
+              <a:defRPr/>
+            </a:pPr>
+            <a:endParaRPr lang="en-US" sz="2000" dirty="0">
+              <a:solidFill>
+                <a:srgbClr val="0000A8"/>
+              </a:solidFill>
+              <a:latin typeface="Helvetica" pitchFamily="2" charset="0"/>
+            </a:endParaRPr>
           </a:p>
           <a:p>
             <a:pPr lvl="1">
@@ -31604,16 +31929,21 @@
           <a:lstStyle/>
           <a:p>
             <a:r>
-              <a:rPr lang="en-US" dirty="0"/>
-              <a:t>ARP content credit: </a:t>
+              <a:rPr lang="en-US" dirty="0">
+                <a:latin typeface="Helvetica" pitchFamily="2" charset="0"/>
+              </a:rPr>
+              <a:t>Credit: </a:t>
             </a:r>
             <a:r>
               <a:rPr lang="en-US" dirty="0">
+                <a:latin typeface="Helvetica" pitchFamily="2" charset="0"/>
                 <a:hlinkClick r:id="rId4"/>
               </a:rPr>
               <a:t>http://gaia.cs.umass.edu/kurose_ross/ppt.htm</a:t>
             </a:r>
-            <a:endParaRPr lang="en-US" dirty="0"/>
+            <a:endParaRPr lang="en-US" dirty="0">
+              <a:latin typeface="Helvetica" pitchFamily="2" charset="0"/>
+            </a:endParaRPr>
           </a:p>
         </p:txBody>
       </p:sp>
@@ -31859,7 +32189,7 @@
                                         <p:tgtEl>
                                           <p:spTgt spid="97">
                                             <p:txEl>
-                                              <p:pRg st="2" end="2"/>
+                                              <p:pRg st="3" end="3"/>
                                             </p:txEl>
                                           </p:spTgt>
                                         </p:tgtEl>
@@ -31877,7 +32207,7 @@
                                         <p:tgtEl>
                                           <p:spTgt spid="97">
                                             <p:txEl>
-                                              <p:pRg st="2" end="2"/>
+                                              <p:pRg st="3" end="3"/>
                                             </p:txEl>
                                           </p:spTgt>
                                         </p:tgtEl>

</xml_diff>